<commit_message>
Updated Logic in DeveloperGuide
</commit_message>
<xml_diff>
--- a/docs/diagrams/LogicComponentClassDiagram.pptx
+++ b/docs/diagrams/LogicComponentClassDiagram.pptx
@@ -4392,14 +4392,13 @@
           <p:cNvPr id="25" name="Elbow Connector 63"/>
           <p:cNvCxnSpPr>
             <a:stCxn id="5" idx="2"/>
-            <a:endCxn id="12" idx="1"/>
           </p:cNvCxnSpPr>
           <p:nvPr/>
         </p:nvCxnSpPr>
         <p:spPr>
           <a:xfrm rot="16200000" flipH="1">
-            <a:off x="4867401" y="1751582"/>
-            <a:ext cx="26778" cy="5114898"/>
+            <a:off x="4840186" y="1778797"/>
+            <a:ext cx="81209" cy="5114898"/>
           </a:xfrm>
           <a:prstGeom prst="bentConnector2">
             <a:avLst/>
@@ -4675,7 +4674,7 @@
         </p:nvSpPr>
         <p:spPr>
           <a:xfrm>
-            <a:off x="2912207" y="3709457"/>
+            <a:off x="2840684" y="3960168"/>
             <a:ext cx="131116" cy="230832"/>
           </a:xfrm>
           <a:prstGeom prst="rect">
@@ -4762,47 +4761,6 @@
           </a:p>
         </p:txBody>
       </p:sp>
-      <p:cxnSp>
-        <p:nvCxnSpPr>
-          <p:cNvPr id="39" name="Elbow Connector 122"/>
-          <p:cNvCxnSpPr/>
-          <p:nvPr/>
-        </p:nvCxnSpPr>
-        <p:spPr>
-          <a:xfrm rot="16200000" flipV="1">
-            <a:off x="976413" y="2775660"/>
-            <a:ext cx="2330409" cy="16035"/>
-          </a:xfrm>
-          <a:prstGeom prst="bentConnector3">
-            <a:avLst>
-              <a:gd name="adj1" fmla="val 50000"/>
-            </a:avLst>
-          </a:prstGeom>
-          <a:ln w="19050">
-            <a:solidFill>
-              <a:srgbClr val="0070C0"/>
-            </a:solidFill>
-            <a:prstDash val="sysDot"/>
-            <a:headEnd type="none" w="med" len="med"/>
-            <a:tailEnd type="arrow" w="med" len="med"/>
-          </a:ln>
-          <a:effectLst/>
-        </p:spPr>
-        <p:style>
-          <a:lnRef idx="1">
-            <a:schemeClr val="accent2"/>
-          </a:lnRef>
-          <a:fillRef idx="2">
-            <a:schemeClr val="accent2"/>
-          </a:fillRef>
-          <a:effectRef idx="1">
-            <a:schemeClr val="accent2"/>
-          </a:effectRef>
-          <a:fontRef idx="minor">
-            <a:schemeClr val="dk1"/>
-          </a:fontRef>
-        </p:style>
-      </p:cxnSp>
       <p:sp>
         <p:nvSpPr>
           <p:cNvPr id="42" name="Rectangle 11"/>
@@ -5008,7 +4966,7 @@
         </p:nvSpPr>
         <p:spPr>
           <a:xfrm>
-            <a:off x="2812461" y="1710267"/>
+            <a:off x="2812461" y="1634440"/>
             <a:ext cx="751107" cy="346760"/>
           </a:xfrm>
           <a:prstGeom prst="rect">
@@ -5088,7 +5046,7 @@
         </p:nvSpPr>
         <p:spPr>
           <a:xfrm>
-            <a:off x="2818488" y="2160512"/>
+            <a:off x="2819400" y="2160512"/>
             <a:ext cx="726243" cy="174580"/>
           </a:xfrm>
           <a:prstGeom prst="rect">
@@ -5130,7 +5088,7 @@
           <a:p>
             <a:pPr algn="ctr"/>
             <a:r>
-              <a:rPr lang="en-US" sz="1050" dirty="0" smtClean="0">
+              <a:rPr lang="en-US" sz="1050" dirty="0">
                 <a:solidFill>
                   <a:schemeClr val="bg1"/>
                 </a:solidFill>
@@ -5571,60 +5529,13 @@
       </p:cxnSp>
       <p:cxnSp>
         <p:nvCxnSpPr>
-          <p:cNvPr id="13" name="Elbow Connector 12"/>
-          <p:cNvCxnSpPr>
-            <a:stCxn id="60" idx="0"/>
-            <a:endCxn id="58" idx="2"/>
-          </p:cNvCxnSpPr>
-          <p:nvPr/>
-        </p:nvCxnSpPr>
-        <p:spPr>
-          <a:xfrm rot="16200000" flipV="1">
-            <a:off x="3123530" y="2393173"/>
-            <a:ext cx="129155" cy="12993"/>
-          </a:xfrm>
-          <a:prstGeom prst="bentConnector3">
-            <a:avLst>
-              <a:gd name="adj1" fmla="val 50000"/>
-            </a:avLst>
-          </a:prstGeom>
-          <a:ln w="19050">
-            <a:solidFill>
-              <a:schemeClr val="accent5">
-                <a:lumMod val="60000"/>
-                <a:lumOff val="40000"/>
-              </a:schemeClr>
-            </a:solidFill>
-            <a:prstDash val="sysDot"/>
-            <a:headEnd type="none" w="med" len="med"/>
-            <a:tailEnd type="arrow" w="med" len="med"/>
-          </a:ln>
-          <a:effectLst/>
-        </p:spPr>
-        <p:style>
-          <a:lnRef idx="1">
-            <a:schemeClr val="accent2"/>
-          </a:lnRef>
-          <a:fillRef idx="2">
-            <a:schemeClr val="accent2"/>
-          </a:fillRef>
-          <a:effectRef idx="1">
-            <a:schemeClr val="accent2"/>
-          </a:effectRef>
-          <a:fontRef idx="minor">
-            <a:schemeClr val="dk1"/>
-          </a:fontRef>
-        </p:style>
-      </p:cxnSp>
-      <p:cxnSp>
-        <p:nvCxnSpPr>
           <p:cNvPr id="47" name="Straight Connector 46"/>
           <p:cNvCxnSpPr/>
           <p:nvPr/>
         </p:nvCxnSpPr>
         <p:spPr>
           <a:xfrm>
-            <a:off x="3551441" y="1874254"/>
+            <a:off x="3551441" y="1828800"/>
             <a:ext cx="346666" cy="0"/>
           </a:xfrm>
           <a:prstGeom prst="line">
@@ -5639,53 +5550,6 @@
             <a:prstDash val="sysDot"/>
             <a:headEnd type="arrow" w="med" len="med"/>
             <a:tailEnd type="none" w="med" len="med"/>
-          </a:ln>
-          <a:effectLst/>
-        </p:spPr>
-        <p:style>
-          <a:lnRef idx="1">
-            <a:schemeClr val="accent2"/>
-          </a:lnRef>
-          <a:fillRef idx="2">
-            <a:schemeClr val="accent2"/>
-          </a:fillRef>
-          <a:effectRef idx="1">
-            <a:schemeClr val="accent2"/>
-          </a:effectRef>
-          <a:fontRef idx="minor">
-            <a:schemeClr val="dk1"/>
-          </a:fontRef>
-        </p:style>
-      </p:cxnSp>
-      <p:cxnSp>
-        <p:nvCxnSpPr>
-          <p:cNvPr id="50" name="Elbow Connector 49"/>
-          <p:cNvCxnSpPr>
-            <a:stCxn id="56" idx="2"/>
-            <a:endCxn id="58" idx="0"/>
-          </p:cNvCxnSpPr>
-          <p:nvPr/>
-        </p:nvCxnSpPr>
-        <p:spPr>
-          <a:xfrm rot="5400000">
-            <a:off x="3133071" y="2105567"/>
-            <a:ext cx="103485" cy="6405"/>
-          </a:xfrm>
-          <a:prstGeom prst="bentConnector3">
-            <a:avLst>
-              <a:gd name="adj1" fmla="val 50000"/>
-            </a:avLst>
-          </a:prstGeom>
-          <a:ln w="19050">
-            <a:solidFill>
-              <a:schemeClr val="accent5">
-                <a:lumMod val="60000"/>
-                <a:lumOff val="40000"/>
-              </a:schemeClr>
-            </a:solidFill>
-            <a:prstDash val="sysDot"/>
-            <a:headEnd type="none" w="med" len="med"/>
-            <a:tailEnd type="arrow" w="med" len="med"/>
           </a:ln>
           <a:effectLst/>
         </p:spPr>
@@ -6249,8 +6113,8 @@
         </p:nvCxnSpPr>
         <p:spPr>
           <a:xfrm>
-            <a:off x="3886200" y="1898597"/>
-            <a:ext cx="8472" cy="1810860"/>
+            <a:off x="3894672" y="1828800"/>
+            <a:ext cx="0" cy="1839290"/>
           </a:xfrm>
           <a:prstGeom prst="line">
             <a:avLst/>
@@ -6519,7 +6383,7 @@
         </p:nvSpPr>
         <p:spPr>
           <a:xfrm>
-            <a:off x="2386835" y="3522162"/>
+            <a:off x="2386835" y="3526180"/>
             <a:ext cx="1181386" cy="283820"/>
           </a:xfrm>
           <a:prstGeom prst="rect">
@@ -6638,6 +6502,134 @@
             <a:solidFill>
               <a:srgbClr val="0070C0"/>
             </a:solidFill>
+            <a:headEnd type="none" w="med" len="med"/>
+            <a:tailEnd type="arrow" w="med" len="med"/>
+          </a:ln>
+          <a:effectLst/>
+        </p:spPr>
+        <p:style>
+          <a:lnRef idx="1">
+            <a:schemeClr val="accent2"/>
+          </a:lnRef>
+          <a:fillRef idx="2">
+            <a:schemeClr val="accent2"/>
+          </a:fillRef>
+          <a:effectRef idx="1">
+            <a:schemeClr val="accent2"/>
+          </a:effectRef>
+          <a:fontRef idx="minor">
+            <a:schemeClr val="dk1"/>
+          </a:fontRef>
+        </p:style>
+      </p:cxnSp>
+      <p:cxnSp>
+        <p:nvCxnSpPr>
+          <p:cNvPr id="15" name="Straight Arrow Connector 14"/>
+          <p:cNvCxnSpPr/>
+          <p:nvPr/>
+        </p:nvCxnSpPr>
+        <p:spPr>
+          <a:xfrm flipV="1">
+            <a:off x="2209800" y="1599827"/>
+            <a:ext cx="0" cy="2345401"/>
+          </a:xfrm>
+          <a:prstGeom prst="straightConnector1">
+            <a:avLst/>
+          </a:prstGeom>
+          <a:ln w="19050">
+            <a:solidFill>
+              <a:srgbClr val="0070C0"/>
+            </a:solidFill>
+            <a:prstDash val="sysDot"/>
+            <a:headEnd type="none" w="med" len="med"/>
+            <a:tailEnd type="arrow" w="med" len="med"/>
+          </a:ln>
+          <a:effectLst/>
+        </p:spPr>
+        <p:style>
+          <a:lnRef idx="1">
+            <a:schemeClr val="accent2"/>
+          </a:lnRef>
+          <a:fillRef idx="2">
+            <a:schemeClr val="accent2"/>
+          </a:fillRef>
+          <a:effectRef idx="1">
+            <a:schemeClr val="accent2"/>
+          </a:effectRef>
+          <a:fontRef idx="minor">
+            <a:schemeClr val="dk1"/>
+          </a:fontRef>
+        </p:style>
+      </p:cxnSp>
+      <p:cxnSp>
+        <p:nvCxnSpPr>
+          <p:cNvPr id="75" name="Straight Arrow Connector 74"/>
+          <p:cNvCxnSpPr>
+            <a:endCxn id="58" idx="2"/>
+          </p:cNvCxnSpPr>
+          <p:nvPr/>
+        </p:nvCxnSpPr>
+        <p:spPr>
+          <a:xfrm flipH="1" flipV="1">
+            <a:off x="3182522" y="2335092"/>
+            <a:ext cx="7973" cy="129155"/>
+          </a:xfrm>
+          <a:prstGeom prst="straightConnector1">
+            <a:avLst/>
+          </a:prstGeom>
+          <a:ln w="19050">
+            <a:solidFill>
+              <a:schemeClr val="accent4">
+                <a:lumMod val="60000"/>
+                <a:lumOff val="40000"/>
+              </a:schemeClr>
+            </a:solidFill>
+            <a:prstDash val="sysDot"/>
+            <a:headEnd type="none" w="med" len="med"/>
+            <a:tailEnd type="arrow" w="med" len="med"/>
+          </a:ln>
+          <a:effectLst/>
+        </p:spPr>
+        <p:style>
+          <a:lnRef idx="1">
+            <a:schemeClr val="accent2"/>
+          </a:lnRef>
+          <a:fillRef idx="2">
+            <a:schemeClr val="accent2"/>
+          </a:fillRef>
+          <a:effectRef idx="1">
+            <a:schemeClr val="accent2"/>
+          </a:effectRef>
+          <a:fontRef idx="minor">
+            <a:schemeClr val="dk1"/>
+          </a:fontRef>
+        </p:style>
+      </p:cxnSp>
+      <p:cxnSp>
+        <p:nvCxnSpPr>
+          <p:cNvPr id="76" name="Straight Arrow Connector 75"/>
+          <p:cNvCxnSpPr>
+            <a:stCxn id="56" idx="2"/>
+            <a:endCxn id="58" idx="0"/>
+          </p:cNvCxnSpPr>
+          <p:nvPr/>
+        </p:nvCxnSpPr>
+        <p:spPr>
+          <a:xfrm flipH="1">
+            <a:off x="3182522" y="1981200"/>
+            <a:ext cx="5493" cy="179312"/>
+          </a:xfrm>
+          <a:prstGeom prst="straightConnector1">
+            <a:avLst/>
+          </a:prstGeom>
+          <a:ln w="19050">
+            <a:solidFill>
+              <a:schemeClr val="accent4">
+                <a:lumMod val="60000"/>
+                <a:lumOff val="40000"/>
+              </a:schemeClr>
+            </a:solidFill>
+            <a:prstDash val="sysDot"/>
             <a:headEnd type="none" w="med" len="med"/>
             <a:tailEnd type="arrow" w="med" len="med"/>
           </a:ln>

</xml_diff>

<commit_message>
updated logic sequence UML in developer guide
</commit_message>
<xml_diff>
--- a/docs/diagrams/LogicComponentClassDiagram.pptx
+++ b/docs/diagrams/LogicComponentClassDiagram.pptx
@@ -3569,7 +3569,7 @@
           <a:p>
             <a:pPr algn="ctr"/>
             <a:r>
-              <a:rPr lang="en-US" sz="1050" dirty="0" err="1">
+              <a:rPr lang="en-US" sz="1050" dirty="0">
                 <a:solidFill>
                   <a:schemeClr val="bg1"/>
                 </a:solidFill>
@@ -3625,7 +3625,7 @@
           <a:p>
             <a:pPr algn="ctr"/>
             <a:r>
-              <a:rPr lang="en-US" sz="1050" b="1" dirty="0" err="1" smtClean="0">
+              <a:rPr lang="en-US" sz="1050" b="1" dirty="0" smtClean="0">
                 <a:solidFill>
                   <a:srgbClr val="0070C0"/>
                 </a:solidFill>
@@ -3684,7 +3684,7 @@
           <a:p>
             <a:pPr algn="ctr"/>
             <a:r>
-              <a:rPr lang="en-US" sz="1050" dirty="0" err="1">
+              <a:rPr lang="en-US" sz="1050" dirty="0">
                 <a:solidFill>
                   <a:schemeClr val="bg1"/>
                 </a:solidFill>
@@ -3887,7 +3887,7 @@
           <a:p>
             <a:pPr algn="ctr"/>
             <a:r>
-              <a:rPr lang="en-US" sz="1050" b="1" dirty="0" err="1" smtClean="0">
+              <a:rPr lang="en-US" sz="1050" b="1" dirty="0" smtClean="0">
                 <a:solidFill>
                   <a:srgbClr val="0070C0"/>
                 </a:solidFill>
@@ -4801,18 +4801,13 @@
           <a:p>
             <a:pPr algn="ctr"/>
             <a:r>
-              <a:rPr lang="en-US" sz="1050" b="1" dirty="0" err="1">
+              <a:rPr lang="en-US" sz="1050" b="1" dirty="0">
                 <a:solidFill>
                   <a:schemeClr val="bg1"/>
                 </a:solidFill>
               </a:rPr>
               <a:t>AddCommand</a:t>
             </a:r>
-            <a:endParaRPr lang="en-US" sz="1050" b="1" dirty="0">
-              <a:solidFill>
-                <a:schemeClr val="bg1"/>
-              </a:solidFill>
-            </a:endParaRPr>
           </a:p>
           <a:p>
             <a:pPr algn="ctr"/>
@@ -4872,18 +4867,13 @@
           <a:p>
             <a:pPr algn="ctr"/>
             <a:r>
-              <a:rPr lang="en-US" sz="1050" b="1" dirty="0" err="1">
+              <a:rPr lang="en-US" sz="1050" b="1" dirty="0">
                 <a:solidFill>
                   <a:schemeClr val="bg1"/>
                 </a:solidFill>
               </a:rPr>
               <a:t>FindCommand</a:t>
             </a:r>
-            <a:endParaRPr lang="en-US" sz="1050" b="1" dirty="0">
-              <a:solidFill>
-                <a:schemeClr val="bg1"/>
-              </a:solidFill>
-            </a:endParaRPr>
           </a:p>
           <a:p>
             <a:pPr algn="ctr"/>
@@ -5363,7 +5353,7 @@
           <a:p>
             <a:pPr algn="ctr"/>
             <a:r>
-              <a:rPr lang="en-SG" sz="1050" dirty="0" err="1" smtClean="0">
+              <a:rPr lang="en-SG" sz="1050" dirty="0" smtClean="0">
                 <a:solidFill>
                   <a:schemeClr val="bg1"/>
                 </a:solidFill>
@@ -5428,7 +5418,7 @@
           <a:p>
             <a:pPr algn="ctr"/>
             <a:r>
-              <a:rPr lang="en-SG" sz="1050" dirty="0" err="1" smtClean="0">
+              <a:rPr lang="en-SG" sz="1050" dirty="0" smtClean="0">
                 <a:solidFill>
                   <a:schemeClr val="bg1"/>
                 </a:solidFill>
@@ -6319,7 +6309,7 @@
           <a:p>
             <a:pPr algn="ctr"/>
             <a:r>
-              <a:rPr lang="en-SG" sz="1050" dirty="0" err="1" smtClean="0">
+              <a:rPr lang="en-SG" sz="1050" dirty="0" smtClean="0">
                 <a:solidFill>
                   <a:schemeClr val="bg1"/>
                 </a:solidFill>
@@ -6425,7 +6415,7 @@
           <a:p>
             <a:pPr algn="ctr"/>
             <a:r>
-              <a:rPr lang="en-SG" sz="1050" dirty="0" err="1" smtClean="0">
+              <a:rPr lang="en-SG" sz="1050" dirty="0" smtClean="0">
                 <a:solidFill>
                   <a:schemeClr val="bg1"/>
                 </a:solidFill>

</xml_diff>